<commit_message>
fixed error in short report
</commit_message>
<xml_diff>
--- a/documents/master_thesis/short_report.pptx
+++ b/documents/master_thesis/short_report.pptx
@@ -3104,35 +3104,8 @@
                 <a:latin typeface="+mj-lt"/>
                 <a:cs typeface="Arial" charset="0"/>
               </a:rPr>
-              <a:t> </a:t>
-            </a:r>
-            <a:r>
-              <a:rPr lang="de-DE" sz="3200" dirty="0" smtClean="0">
-                <a:solidFill>
-                  <a:srgbClr val="0065BD"/>
-                </a:solidFill>
-                <a:latin typeface="+mj-lt"/>
-                <a:cs typeface="Arial" charset="0"/>
-              </a:rPr>
-              <a:t>Embedding Load </a:t>
-            </a:r>
-            <a:r>
-              <a:rPr lang="de-DE" sz="3200" dirty="0" smtClean="0">
-                <a:solidFill>
-                  <a:srgbClr val="0065BD"/>
-                </a:solidFill>
-                <a:latin typeface="+mj-lt"/>
-                <a:cs typeface="Arial" charset="0"/>
-              </a:rPr>
-              <a:t>Flow zur Berechnung des deutschen Übertragungsnetzes</a:t>
-            </a:r>
-            <a:endParaRPr lang="de-DE" sz="3200" dirty="0" smtClean="0">
-              <a:solidFill>
-                <a:srgbClr val="0065BD"/>
-              </a:solidFill>
-              <a:latin typeface="+mj-lt"/>
-              <a:cs typeface="Arial" charset="0"/>
-            </a:endParaRPr>
+              <a:t> Embedding Load Flow zur Berechnung des deutschen Übertragungsnetzes</a:t>
+            </a:r>
           </a:p>
           <a:p>
             <a:pPr algn="ctr">
@@ -3178,21 +3151,8 @@
                   <a:schemeClr val="bg2"/>
                 </a:solidFill>
               </a:rPr>
-              <a:t>Kurzbericht </a:t>
-            </a:r>
-            <a:r>
-              <a:rPr lang="de-DE" altLang="de-DE" sz="2000" dirty="0" smtClean="0">
-                <a:solidFill>
-                  <a:schemeClr val="bg2"/>
-                </a:solidFill>
-              </a:rPr>
-              <a:t>Masterthesis</a:t>
-            </a:r>
-            <a:endParaRPr lang="de-DE" altLang="de-DE" sz="2000" dirty="0" smtClean="0">
-              <a:solidFill>
-                <a:schemeClr val="bg2"/>
-              </a:solidFill>
-            </a:endParaRPr>
+              <a:t>Kurzbericht Masterthesis</a:t>
+            </a:r>
           </a:p>
         </p:txBody>
       </p:sp>
@@ -3334,21 +3294,8 @@
             </a:r>
             <a:r>
               <a:rPr lang="de-DE" altLang="de-DE" dirty="0" smtClean="0"/>
-              <a:t> </a:t>
-            </a:r>
-            <a:r>
-              <a:rPr lang="de-DE" altLang="de-DE" dirty="0" smtClean="0"/>
-              <a:t>Embedding Load Flow (</a:t>
-            </a:r>
-            <a:r>
-              <a:rPr lang="de-DE" altLang="de-DE" dirty="0" smtClean="0"/>
-              <a:t>HELM</a:t>
-            </a:r>
-            <a:r>
-              <a:rPr lang="de-DE" altLang="de-DE" dirty="0" smtClean="0"/>
-              <a:t>) im Vergleich</a:t>
-            </a:r>
-            <a:endParaRPr lang="de-DE" altLang="de-DE" dirty="0" smtClean="0"/>
+              <a:t> Embedding Load Flow (HELM) im Vergleich</a:t>
+            </a:r>
           </a:p>
           <a:p>
             <a:pPr>
@@ -3360,7 +3307,6 @@
               <a:rPr lang="de-DE" altLang="de-DE" dirty="0" smtClean="0"/>
               <a:t>Algorithmus hinter HELM</a:t>
             </a:r>
-            <a:endParaRPr lang="de-DE" altLang="de-DE" dirty="0" smtClean="0"/>
           </a:p>
           <a:p>
             <a:pPr>
@@ -3372,7 +3318,6 @@
               <a:rPr lang="de-DE" altLang="de-DE" dirty="0" smtClean="0"/>
               <a:t>Berechnung des deutschen Übertragungsnetzes</a:t>
             </a:r>
-            <a:endParaRPr lang="de-DE" altLang="de-DE" dirty="0" smtClean="0"/>
           </a:p>
           <a:p>
             <a:pPr>
@@ -3384,7 +3329,6 @@
               <a:rPr lang="de-DE" altLang="de-DE" dirty="0" smtClean="0"/>
               <a:t>Zwischenstand</a:t>
             </a:r>
-            <a:endParaRPr lang="de-DE" altLang="de-DE" dirty="0" smtClean="0"/>
           </a:p>
         </p:txBody>
       </p:sp>
@@ -3572,15 +3516,7 @@
             </a:r>
             <a:r>
               <a:rPr lang="en-US" dirty="0" smtClean="0"/>
-              <a:t> von Holomorphic </a:t>
-            </a:r>
-            <a:r>
-              <a:rPr lang="en-US" dirty="0" smtClean="0"/>
-              <a:t>Embedding Load </a:t>
-            </a:r>
-            <a:r>
-              <a:rPr lang="en-US" dirty="0" smtClean="0"/>
-              <a:t>Flow </a:t>
+              <a:t> von Holomorphic Embedding Load Flow </a:t>
             </a:r>
             <a:r>
               <a:rPr lang="en-US" dirty="0" err="1" smtClean="0"/>
@@ -3665,7 +3601,6 @@
               <a:rPr lang="de-DE" altLang="de-DE" dirty="0" smtClean="0"/>
               <a:t>HELM im Vergleich</a:t>
             </a:r>
-            <a:endParaRPr lang="de-DE" altLang="de-DE" dirty="0" smtClean="0"/>
           </a:p>
         </p:txBody>
       </p:sp>
@@ -3782,7 +3717,6 @@
               <a:rPr lang="de-DE" altLang="de-DE" dirty="0" smtClean="0"/>
               <a:t> zwischen Genauigkeit und Rechenzeit</a:t>
             </a:r>
-            <a:endParaRPr lang="de-DE" altLang="de-DE" dirty="0" smtClean="0"/>
           </a:p>
           <a:p>
             <a:endParaRPr lang="de-DE" altLang="de-DE" dirty="0" smtClean="0"/>
@@ -4242,7 +4176,6 @@
               <a:rPr lang="de-DE" altLang="de-DE" dirty="0" smtClean="0"/>
               <a:t>Auswertung der Funktionen an s = 1</a:t>
             </a:r>
-            <a:endParaRPr lang="de-DE" altLang="de-DE" dirty="0" smtClean="0"/>
           </a:p>
           <a:p>
             <a:endParaRPr lang="de-DE" altLang="de-DE" dirty="0" smtClean="0"/>
@@ -4268,7 +4201,6 @@
               <a:rPr lang="de-DE" altLang="de-DE" dirty="0" smtClean="0"/>
               <a:t>Algorithmus hinter HELM</a:t>
             </a:r>
-            <a:endParaRPr lang="de-DE" altLang="de-DE" dirty="0" smtClean="0"/>
           </a:p>
         </p:txBody>
       </p:sp>
@@ -4588,8 +4520,13 @@
           <a:p>
             <a:r>
               <a:rPr lang="de-DE" altLang="de-DE" dirty="0" smtClean="0"/>
-              <a:t>Implementierung von HELM bisher nur HELM-Flow</a:t>
-            </a:r>
+              <a:t>Implementierung von HELM bisher nur </a:t>
+            </a:r>
+            <a:r>
+              <a:rPr lang="de-DE" altLang="de-DE" dirty="0" smtClean="0"/>
+              <a:t>in HELM-Flow</a:t>
+            </a:r>
+            <a:endParaRPr lang="de-DE" altLang="de-DE" dirty="0" smtClean="0"/>
           </a:p>
           <a:p>
             <a:r>
@@ -4601,15 +4538,15 @@
             <a:pPr lvl="1"/>
             <a:r>
               <a:rPr lang="de-DE" altLang="de-DE" dirty="0" smtClean="0"/>
-              <a:t>Einlesen von </a:t>
-            </a:r>
-            <a:r>
-              <a:rPr lang="de-DE" altLang="de-DE" dirty="0" err="1" smtClean="0"/>
-              <a:t>von</a:t>
+              <a:t>Einlesen </a:t>
             </a:r>
             <a:r>
               <a:rPr lang="de-DE" altLang="de-DE" dirty="0" smtClean="0"/>
-              <a:t> PSS SINCAL Netzen</a:t>
+              <a:t>von PSS </a:t>
+            </a:r>
+            <a:r>
+              <a:rPr lang="de-DE" altLang="de-DE" dirty="0" smtClean="0"/>
+              <a:t>SINCAL Netzen</a:t>
             </a:r>
           </a:p>
           <a:p>

</xml_diff>